<commit_message>
amended graphs labelling in R analysis and also in final powerpoint
</commit_message>
<xml_diff>
--- a/presentations/sales_data_presentation.pptx
+++ b/presentations/sales_data_presentation.pptx
@@ -11333,7 +11333,7 @@
             <a:fld id="{5586B75A-687E-405C-8A0B-8D00578BA2C3}" type="datetimeFigureOut">
               <a:rPr lang="en-US" dirty="0"/>
               <a:pPr/>
-              <a:t>6/10/20</a:t>
+              <a:t>6/16/20</a:t>
             </a:fld>
             <a:endParaRPr lang="en-US" dirty="0"/>
           </a:p>
@@ -11500,7 +11500,7 @@
             <a:fld id="{5586B75A-687E-405C-8A0B-8D00578BA2C3}" type="datetimeFigureOut">
               <a:rPr lang="en-US" dirty="0"/>
               <a:pPr/>
-              <a:t>6/10/20</a:t>
+              <a:t>6/16/20</a:t>
             </a:fld>
             <a:endParaRPr lang="en-US" dirty="0"/>
           </a:p>
@@ -11677,7 +11677,7 @@
             <a:fld id="{5586B75A-687E-405C-8A0B-8D00578BA2C3}" type="datetimeFigureOut">
               <a:rPr lang="en-US" dirty="0"/>
               <a:pPr/>
-              <a:t>6/10/20</a:t>
+              <a:t>6/16/20</a:t>
             </a:fld>
             <a:endParaRPr lang="en-US" dirty="0"/>
           </a:p>
@@ -11844,7 +11844,7 @@
             <a:fld id="{5586B75A-687E-405C-8A0B-8D00578BA2C3}" type="datetimeFigureOut">
               <a:rPr lang="en-US" dirty="0"/>
               <a:pPr/>
-              <a:t>6/10/20</a:t>
+              <a:t>6/16/20</a:t>
             </a:fld>
             <a:endParaRPr lang="en-US" dirty="0"/>
           </a:p>
@@ -12099,7 +12099,7 @@
             <a:fld id="{5586B75A-687E-405C-8A0B-8D00578BA2C3}" type="datetimeFigureOut">
               <a:rPr lang="en-US" dirty="0"/>
               <a:pPr/>
-              <a:t>6/10/20</a:t>
+              <a:t>6/16/20</a:t>
             </a:fld>
             <a:endParaRPr lang="en-US" dirty="0"/>
           </a:p>
@@ -12384,7 +12384,7 @@
             <a:fld id="{5586B75A-687E-405C-8A0B-8D00578BA2C3}" type="datetimeFigureOut">
               <a:rPr lang="en-US" dirty="0"/>
               <a:pPr/>
-              <a:t>6/10/20</a:t>
+              <a:t>6/16/20</a:t>
             </a:fld>
             <a:endParaRPr lang="en-US" dirty="0"/>
           </a:p>
@@ -12823,7 +12823,7 @@
             <a:fld id="{5586B75A-687E-405C-8A0B-8D00578BA2C3}" type="datetimeFigureOut">
               <a:rPr lang="en-US" dirty="0"/>
               <a:pPr/>
-              <a:t>6/10/20</a:t>
+              <a:t>6/16/20</a:t>
             </a:fld>
             <a:endParaRPr lang="en-US" dirty="0"/>
           </a:p>
@@ -12938,7 +12938,7 @@
             <a:fld id="{5586B75A-687E-405C-8A0B-8D00578BA2C3}" type="datetimeFigureOut">
               <a:rPr lang="en-US" dirty="0"/>
               <a:pPr/>
-              <a:t>6/10/20</a:t>
+              <a:t>6/16/20</a:t>
             </a:fld>
             <a:endParaRPr lang="en-US" dirty="0"/>
           </a:p>
@@ -13030,7 +13030,7 @@
             <a:fld id="{5586B75A-687E-405C-8A0B-8D00578BA2C3}" type="datetimeFigureOut">
               <a:rPr lang="en-US" dirty="0"/>
               <a:pPr/>
-              <a:t>6/10/20</a:t>
+              <a:t>6/16/20</a:t>
             </a:fld>
             <a:endParaRPr lang="en-US" dirty="0"/>
           </a:p>
@@ -13315,7 +13315,7 @@
             <a:fld id="{5586B75A-687E-405C-8A0B-8D00578BA2C3}" type="datetimeFigureOut">
               <a:rPr lang="en-US" dirty="0"/>
               <a:pPr/>
-              <a:t>6/10/20</a:t>
+              <a:t>6/16/20</a:t>
             </a:fld>
             <a:endParaRPr lang="en-US" dirty="0"/>
           </a:p>
@@ -13585,7 +13585,7 @@
             <a:fld id="{5586B75A-687E-405C-8A0B-8D00578BA2C3}" type="datetimeFigureOut">
               <a:rPr lang="en-US" dirty="0"/>
               <a:pPr/>
-              <a:t>6/10/20</a:t>
+              <a:t>6/16/20</a:t>
             </a:fld>
             <a:endParaRPr lang="en-US" dirty="0"/>
           </a:p>
@@ -13879,7 +13879,7 @@
             <a:fld id="{5586B75A-687E-405C-8A0B-8D00578BA2C3}" type="datetimeFigureOut">
               <a:rPr lang="en-US" dirty="0"/>
               <a:pPr/>
-              <a:t>6/10/20</a:t>
+              <a:t>6/16/20</a:t>
             </a:fld>
             <a:endParaRPr lang="en-US" dirty="0"/>
           </a:p>
@@ -15737,233 +15737,6 @@
       </p:grpSpPr>
       <p:sp>
         <p:nvSpPr>
-          <p:cNvPr id="21" name="Rectangle 20">
-            <a:extLst>
-              <a:ext uri="{FF2B5EF4-FFF2-40B4-BE49-F238E27FC236}">
-                <a16:creationId xmlns:a16="http://schemas.microsoft.com/office/drawing/2014/main" id="{17115F77-2FAE-4CA7-9A7F-10D5F2C8F831}"/>
-              </a:ext>
-              <a:ext uri="{C183D7F6-B498-43B3-948B-1728B52AA6E4}">
-                <adec:decorative xmlns:adec="http://schemas.microsoft.com/office/drawing/2017/decorative" val="1"/>
-              </a:ext>
-            </a:extLst>
-          </p:cNvPr>
-          <p:cNvSpPr>
-            <a:spLocks noGrp="1" noRot="1" noChangeAspect="1" noMove="1" noResize="1" noEditPoints="1" noAdjustHandles="1" noChangeArrowheads="1" noChangeShapeType="1" noTextEdit="1"/>
-          </p:cNvSpPr>
-          <p:nvPr>
-            <p:extLst>
-              <p:ext uri="{386F3935-93C4-4BCD-93E2-E3B085C9AB24}">
-                <p16:designElem xmlns:p16="http://schemas.microsoft.com/office/powerpoint/2015/main" val="1"/>
-              </p:ext>
-            </p:extLst>
-          </p:nvPr>
-        </p:nvSpPr>
-        <p:spPr>
-          <a:xfrm>
-            <a:off x="0" y="761999"/>
-            <a:ext cx="9141619" cy="5334001"/>
-          </a:xfrm>
-          <a:prstGeom prst="rect">
-            <a:avLst/>
-          </a:prstGeom>
-          <a:solidFill>
-            <a:schemeClr val="accent1"/>
-          </a:solidFill>
-          <a:ln>
-            <a:noFill/>
-          </a:ln>
-        </p:spPr>
-        <p:style>
-          <a:lnRef idx="2">
-            <a:schemeClr val="accent1">
-              <a:shade val="50000"/>
-            </a:schemeClr>
-          </a:lnRef>
-          <a:fillRef idx="1">
-            <a:schemeClr val="accent1"/>
-          </a:fillRef>
-          <a:effectRef idx="0">
-            <a:schemeClr val="accent1"/>
-          </a:effectRef>
-          <a:fontRef idx="minor">
-            <a:schemeClr val="lt1"/>
-          </a:fontRef>
-        </p:style>
-      </p:sp>
-      <p:sp>
-        <p:nvSpPr>
-          <p:cNvPr id="23" name="Rectangle 22">
-            <a:extLst>
-              <a:ext uri="{FF2B5EF4-FFF2-40B4-BE49-F238E27FC236}">
-                <a16:creationId xmlns:a16="http://schemas.microsoft.com/office/drawing/2014/main" id="{5CD4C046-A04C-46CC-AFA3-6B0621F628C8}"/>
-              </a:ext>
-              <a:ext uri="{C183D7F6-B498-43B3-948B-1728B52AA6E4}">
-                <adec:decorative xmlns:adec="http://schemas.microsoft.com/office/drawing/2017/decorative" val="1"/>
-              </a:ext>
-            </a:extLst>
-          </p:cNvPr>
-          <p:cNvSpPr>
-            <a:spLocks noGrp="1" noRot="1" noChangeAspect="1" noMove="1" noResize="1" noEditPoints="1" noAdjustHandles="1" noChangeArrowheads="1" noChangeShapeType="1" noTextEdit="1"/>
-          </p:cNvSpPr>
-          <p:nvPr>
-            <p:extLst>
-              <p:ext uri="{386F3935-93C4-4BCD-93E2-E3B085C9AB24}">
-                <p16:designElem xmlns:p16="http://schemas.microsoft.com/office/powerpoint/2015/main" val="1"/>
-              </p:ext>
-            </p:extLst>
-          </p:nvPr>
-        </p:nvSpPr>
-        <p:spPr>
-          <a:xfrm>
-            <a:off x="9270263" y="761999"/>
-            <a:ext cx="2925318" cy="5334001"/>
-          </a:xfrm>
-          <a:prstGeom prst="rect">
-            <a:avLst/>
-          </a:prstGeom>
-          <a:solidFill>
-            <a:srgbClr val="C8C8C8">
-              <a:alpha val="49804"/>
-            </a:srgbClr>
-          </a:solidFill>
-          <a:ln>
-            <a:noFill/>
-          </a:ln>
-        </p:spPr>
-        <p:style>
-          <a:lnRef idx="2">
-            <a:schemeClr val="accent1">
-              <a:shade val="50000"/>
-            </a:schemeClr>
-          </a:lnRef>
-          <a:fillRef idx="1">
-            <a:schemeClr val="accent1"/>
-          </a:fillRef>
-          <a:effectRef idx="0">
-            <a:schemeClr val="accent1"/>
-          </a:effectRef>
-          <a:fontRef idx="minor">
-            <a:schemeClr val="lt1"/>
-          </a:fontRef>
-        </p:style>
-      </p:sp>
-      <p:sp useBgFill="1">
-        <p:nvSpPr>
-          <p:cNvPr id="25" name="Rectangle 24">
-            <a:extLst>
-              <a:ext uri="{FF2B5EF4-FFF2-40B4-BE49-F238E27FC236}">
-                <a16:creationId xmlns:a16="http://schemas.microsoft.com/office/drawing/2014/main" id="{66C7A97A-A7DE-4DFB-8542-1E4BF24C7D31}"/>
-              </a:ext>
-              <a:ext uri="{C183D7F6-B498-43B3-948B-1728B52AA6E4}">
-                <adec:decorative xmlns:adec="http://schemas.microsoft.com/office/drawing/2017/decorative" val="1"/>
-              </a:ext>
-            </a:extLst>
-          </p:cNvPr>
-          <p:cNvSpPr>
-            <a:spLocks noGrp="1" noRot="1" noChangeAspect="1" noMove="1" noResize="1" noEditPoints="1" noAdjustHandles="1" noChangeArrowheads="1" noChangeShapeType="1" noTextEdit="1"/>
-          </p:cNvSpPr>
-          <p:nvPr>
-            <p:extLst>
-              <p:ext uri="{386F3935-93C4-4BCD-93E2-E3B085C9AB24}">
-                <p16:designElem xmlns:p16="http://schemas.microsoft.com/office/powerpoint/2015/main" val="1"/>
-              </p:ext>
-            </p:extLst>
-          </p:nvPr>
-        </p:nvSpPr>
-        <p:spPr>
-          <a:xfrm>
-            <a:off x="0" y="0"/>
-            <a:ext cx="12191999" cy="6858000"/>
-          </a:xfrm>
-          <a:prstGeom prst="rect">
-            <a:avLst/>
-          </a:prstGeom>
-          <a:ln>
-            <a:noFill/>
-          </a:ln>
-        </p:spPr>
-        <p:style>
-          <a:lnRef idx="2">
-            <a:schemeClr val="accent1">
-              <a:shade val="50000"/>
-            </a:schemeClr>
-          </a:lnRef>
-          <a:fillRef idx="1">
-            <a:schemeClr val="accent1"/>
-          </a:fillRef>
-          <a:effectRef idx="0">
-            <a:schemeClr val="accent1"/>
-          </a:effectRef>
-          <a:fontRef idx="minor">
-            <a:schemeClr val="lt1"/>
-          </a:fontRef>
-        </p:style>
-        <p:txBody>
-          <a:bodyPr rtlCol="0" anchor="ctr"/>
-          <a:lstStyle/>
-          <a:p>
-            <a:pPr algn="ctr"/>
-            <a:endParaRPr lang="en-US"/>
-          </a:p>
-        </p:txBody>
-      </p:sp>
-      <p:sp>
-        <p:nvSpPr>
-          <p:cNvPr id="27" name="Rectangle 26">
-            <a:extLst>
-              <a:ext uri="{FF2B5EF4-FFF2-40B4-BE49-F238E27FC236}">
-                <a16:creationId xmlns:a16="http://schemas.microsoft.com/office/drawing/2014/main" id="{BE111DB0-3D73-4D20-9D57-CEF5A0D865B9}"/>
-              </a:ext>
-              <a:ext uri="{C183D7F6-B498-43B3-948B-1728B52AA6E4}">
-                <adec:decorative xmlns:adec="http://schemas.microsoft.com/office/drawing/2017/decorative" val="1"/>
-              </a:ext>
-            </a:extLst>
-          </p:cNvPr>
-          <p:cNvSpPr>
-            <a:spLocks noGrp="1" noRot="1" noChangeAspect="1" noMove="1" noResize="1" noEditPoints="1" noAdjustHandles="1" noChangeArrowheads="1" noChangeShapeType="1" noTextEdit="1"/>
-          </p:cNvSpPr>
-          <p:nvPr>
-            <p:extLst>
-              <p:ext uri="{386F3935-93C4-4BCD-93E2-E3B085C9AB24}">
-                <p16:designElem xmlns:p16="http://schemas.microsoft.com/office/powerpoint/2015/main" val="1"/>
-              </p:ext>
-            </p:extLst>
-          </p:nvPr>
-        </p:nvSpPr>
-        <p:spPr>
-          <a:xfrm>
-            <a:off x="1" y="761999"/>
-            <a:ext cx="4642228" cy="5334001"/>
-          </a:xfrm>
-          <a:prstGeom prst="rect">
-            <a:avLst/>
-          </a:prstGeom>
-          <a:solidFill>
-            <a:schemeClr val="accent1"/>
-          </a:solidFill>
-          <a:ln>
-            <a:noFill/>
-          </a:ln>
-        </p:spPr>
-        <p:style>
-          <a:lnRef idx="2">
-            <a:schemeClr val="accent1">
-              <a:shade val="50000"/>
-            </a:schemeClr>
-          </a:lnRef>
-          <a:fillRef idx="1">
-            <a:schemeClr val="accent1"/>
-          </a:fillRef>
-          <a:effectRef idx="0">
-            <a:schemeClr val="accent1"/>
-          </a:effectRef>
-          <a:fontRef idx="minor">
-            <a:schemeClr val="lt1"/>
-          </a:fontRef>
-        </p:style>
-      </p:sp>
-      <p:sp>
-        <p:nvSpPr>
           <p:cNvPr id="2" name="Title 1">
             <a:extLst>
               <a:ext uri="{FF2B5EF4-FFF2-40B4-BE49-F238E27FC236}">
@@ -15980,111 +15753,85 @@
         </p:nvSpPr>
         <p:spPr>
           <a:xfrm>
-            <a:off x="643467" y="1298448"/>
-            <a:ext cx="3685070" cy="3255264"/>
+            <a:off x="252919" y="1123837"/>
+            <a:ext cx="2947482" cy="4601183"/>
           </a:xfrm>
         </p:spPr>
         <p:txBody>
-          <a:bodyPr vert="horz" lIns="91440" tIns="45720" rIns="91440" bIns="45720" rtlCol="0" anchor="b">
+          <a:bodyPr vert="horz" lIns="91440" tIns="45720" rIns="91440" bIns="45720" rtlCol="0">
             <a:normAutofit/>
           </a:bodyPr>
           <a:lstStyle/>
           <a:p>
             <a:r>
-              <a:rPr lang="en-US" sz="5500" spc="-100" dirty="0"/>
+              <a:rPr lang="en-US" spc="-100"/>
               <a:t>What are the most common genres?</a:t>
             </a:r>
           </a:p>
         </p:txBody>
       </p:sp>
+      <p:sp>
+        <p:nvSpPr>
+          <p:cNvPr id="33" name="Content Placeholder 32">
+            <a:extLst>
+              <a:ext uri="{FF2B5EF4-FFF2-40B4-BE49-F238E27FC236}">
+                <a16:creationId xmlns:a16="http://schemas.microsoft.com/office/drawing/2014/main" id="{76E65FFF-7191-4D30-A55C-DE9A512FB6EF}"/>
+              </a:ext>
+            </a:extLst>
+          </p:cNvPr>
+          <p:cNvSpPr>
+            <a:spLocks noGrp="1"/>
+          </p:cNvSpPr>
+          <p:nvPr>
+            <p:ph idx="1"/>
+          </p:nvPr>
+        </p:nvSpPr>
+        <p:spPr>
+          <a:xfrm>
+            <a:off x="3869267" y="864108"/>
+            <a:ext cx="3585891" cy="5120640"/>
+          </a:xfrm>
+        </p:spPr>
+        <p:txBody>
+          <a:bodyPr>
+            <a:normAutofit/>
+          </a:bodyPr>
+          <a:lstStyle/>
+          <a:p>
+            <a:endParaRPr lang="en-US"/>
+          </a:p>
+        </p:txBody>
+      </p:sp>
       <p:pic>
         <p:nvPicPr>
-          <p:cNvPr id="5" name="Content Placeholder 4" descr="A picture containing drawing&#10;&#10;Description automatically generated">
+          <p:cNvPr id="7" name="Content Placeholder 6" descr="A screenshot of a cell phone&#10;&#10;Description automatically generated">
             <a:extLst>
               <a:ext uri="{FF2B5EF4-FFF2-40B4-BE49-F238E27FC236}">
-                <a16:creationId xmlns:a16="http://schemas.microsoft.com/office/drawing/2014/main" id="{AE9A999C-F5B0-3746-B92F-F817858663A7}"/>
+                <a16:creationId xmlns:a16="http://schemas.microsoft.com/office/drawing/2014/main" id="{8233C3A0-4C91-6340-9B5D-DF1B262D0571}"/>
               </a:ext>
             </a:extLst>
           </p:cNvPr>
           <p:cNvPicPr>
-            <a:picLocks noGrp="1" noChangeAspect="1"/>
+            <a:picLocks noChangeAspect="1"/>
           </p:cNvPicPr>
-          <p:nvPr>
-            <p:ph idx="1"/>
-          </p:nvPr>
+          <p:nvPr/>
         </p:nvPicPr>
-        <p:blipFill rotWithShape="1">
+        <p:blipFill>
           <a:blip r:embed="rId2"/>
-          <a:srcRect l="13119" r="13124" b="2"/>
-          <a:stretch/>
+          <a:stretch>
+            <a:fillRect/>
+          </a:stretch>
         </p:blipFill>
         <p:spPr>
           <a:xfrm>
-            <a:off x="5120640" y="759599"/>
-            <a:ext cx="6566580" cy="5330650"/>
+            <a:off x="3569218" y="830387"/>
+            <a:ext cx="8095407" cy="4998913"/>
           </a:xfrm>
           <a:prstGeom prst="rect">
             <a:avLst/>
           </a:prstGeom>
         </p:spPr>
       </p:pic>
-      <p:sp>
-        <p:nvSpPr>
-          <p:cNvPr id="29" name="Rectangle 28">
-            <a:extLst>
-              <a:ext uri="{FF2B5EF4-FFF2-40B4-BE49-F238E27FC236}">
-                <a16:creationId xmlns:a16="http://schemas.microsoft.com/office/drawing/2014/main" id="{027ADCA0-A066-4B16-8E1F-3C2483947B72}"/>
-              </a:ext>
-              <a:ext uri="{C183D7F6-B498-43B3-948B-1728B52AA6E4}">
-                <adec:decorative xmlns:adec="http://schemas.microsoft.com/office/drawing/2017/decorative" val="1"/>
-              </a:ext>
-            </a:extLst>
-          </p:cNvPr>
-          <p:cNvSpPr>
-            <a:spLocks noGrp="1" noRot="1" noChangeAspect="1" noMove="1" noResize="1" noEditPoints="1" noAdjustHandles="1" noChangeArrowheads="1" noChangeShapeType="1" noTextEdit="1"/>
-          </p:cNvSpPr>
-          <p:nvPr>
-            <p:extLst>
-              <p:ext uri="{386F3935-93C4-4BCD-93E2-E3B085C9AB24}">
-                <p16:designElem xmlns:p16="http://schemas.microsoft.com/office/powerpoint/2015/main" val="1"/>
-              </p:ext>
-            </p:extLst>
-          </p:nvPr>
-        </p:nvSpPr>
-        <p:spPr>
-          <a:xfrm>
-            <a:off x="11815864" y="758952"/>
-            <a:ext cx="384048" cy="5330952"/>
-          </a:xfrm>
-          <a:prstGeom prst="rect">
-            <a:avLst/>
-          </a:prstGeom>
-          <a:solidFill>
-            <a:srgbClr val="C8C8C8">
-              <a:alpha val="49804"/>
-            </a:srgbClr>
-          </a:solidFill>
-          <a:ln>
-            <a:noFill/>
-          </a:ln>
-        </p:spPr>
-        <p:style>
-          <a:lnRef idx="2">
-            <a:schemeClr val="accent1">
-              <a:shade val="50000"/>
-            </a:schemeClr>
-          </a:lnRef>
-          <a:fillRef idx="1">
-            <a:schemeClr val="accent1"/>
-          </a:fillRef>
-          <a:effectRef idx="0">
-            <a:schemeClr val="accent1"/>
-          </a:effectRef>
-          <a:fontRef idx="minor">
-            <a:schemeClr val="lt1"/>
-          </a:fontRef>
-        </p:style>
-      </p:sp>
     </p:spTree>
     <p:extLst>
       <p:ext uri="{BB962C8B-B14F-4D97-AF65-F5344CB8AC3E}">
@@ -16123,124 +15870,12 @@
           <a:chExt cx="0" cy="0"/>
         </a:xfrm>
       </p:grpSpPr>
-      <p:sp>
+      <p:sp useBgFill="1">
         <p:nvSpPr>
-          <p:cNvPr id="10" name="Rectangle 9">
+          <p:cNvPr id="29" name="Rectangle 22">
             <a:extLst>
               <a:ext uri="{FF2B5EF4-FFF2-40B4-BE49-F238E27FC236}">
-                <a16:creationId xmlns:a16="http://schemas.microsoft.com/office/drawing/2014/main" id="{17115F77-2FAE-4CA7-9A7F-10D5F2C8F831}"/>
-              </a:ext>
-              <a:ext uri="{C183D7F6-B498-43B3-948B-1728B52AA6E4}">
-                <adec:decorative xmlns:adec="http://schemas.microsoft.com/office/drawing/2017/decorative" val="1"/>
-              </a:ext>
-            </a:extLst>
-          </p:cNvPr>
-          <p:cNvSpPr>
-            <a:spLocks noGrp="1" noRot="1" noChangeAspect="1" noMove="1" noResize="1" noEditPoints="1" noAdjustHandles="1" noChangeArrowheads="1" noChangeShapeType="1" noTextEdit="1"/>
-          </p:cNvSpPr>
-          <p:nvPr>
-            <p:extLst>
-              <p:ext uri="{386F3935-93C4-4BCD-93E2-E3B085C9AB24}">
-                <p16:designElem xmlns:p16="http://schemas.microsoft.com/office/powerpoint/2015/main" val="1"/>
-              </p:ext>
-            </p:extLst>
-          </p:nvPr>
-        </p:nvSpPr>
-        <p:spPr>
-          <a:xfrm>
-            <a:off x="0" y="761999"/>
-            <a:ext cx="9141619" cy="5334001"/>
-          </a:xfrm>
-          <a:prstGeom prst="rect">
-            <a:avLst/>
-          </a:prstGeom>
-          <a:solidFill>
-            <a:schemeClr val="accent1"/>
-          </a:solidFill>
-          <a:ln>
-            <a:noFill/>
-          </a:ln>
-        </p:spPr>
-        <p:style>
-          <a:lnRef idx="2">
-            <a:schemeClr val="accent1">
-              <a:shade val="50000"/>
-            </a:schemeClr>
-          </a:lnRef>
-          <a:fillRef idx="1">
-            <a:schemeClr val="accent1"/>
-          </a:fillRef>
-          <a:effectRef idx="0">
-            <a:schemeClr val="accent1"/>
-          </a:effectRef>
-          <a:fontRef idx="minor">
-            <a:schemeClr val="lt1"/>
-          </a:fontRef>
-        </p:style>
-      </p:sp>
-      <p:sp>
-        <p:nvSpPr>
-          <p:cNvPr id="12" name="Rectangle 11">
-            <a:extLst>
-              <a:ext uri="{FF2B5EF4-FFF2-40B4-BE49-F238E27FC236}">
-                <a16:creationId xmlns:a16="http://schemas.microsoft.com/office/drawing/2014/main" id="{5CD4C046-A04C-46CC-AFA3-6B0621F628C8}"/>
-              </a:ext>
-              <a:ext uri="{C183D7F6-B498-43B3-948B-1728B52AA6E4}">
-                <adec:decorative xmlns:adec="http://schemas.microsoft.com/office/drawing/2017/decorative" val="1"/>
-              </a:ext>
-            </a:extLst>
-          </p:cNvPr>
-          <p:cNvSpPr>
-            <a:spLocks noGrp="1" noRot="1" noChangeAspect="1" noMove="1" noResize="1" noEditPoints="1" noAdjustHandles="1" noChangeArrowheads="1" noChangeShapeType="1" noTextEdit="1"/>
-          </p:cNvSpPr>
-          <p:nvPr>
-            <p:extLst>
-              <p:ext uri="{386F3935-93C4-4BCD-93E2-E3B085C9AB24}">
-                <p16:designElem xmlns:p16="http://schemas.microsoft.com/office/powerpoint/2015/main" val="1"/>
-              </p:ext>
-            </p:extLst>
-          </p:nvPr>
-        </p:nvSpPr>
-        <p:spPr>
-          <a:xfrm>
-            <a:off x="9270263" y="761999"/>
-            <a:ext cx="2925318" cy="5334001"/>
-          </a:xfrm>
-          <a:prstGeom prst="rect">
-            <a:avLst/>
-          </a:prstGeom>
-          <a:solidFill>
-            <a:srgbClr val="C8C8C8">
-              <a:alpha val="49804"/>
-            </a:srgbClr>
-          </a:solidFill>
-          <a:ln>
-            <a:noFill/>
-          </a:ln>
-        </p:spPr>
-        <p:style>
-          <a:lnRef idx="2">
-            <a:schemeClr val="accent1">
-              <a:shade val="50000"/>
-            </a:schemeClr>
-          </a:lnRef>
-          <a:fillRef idx="1">
-            <a:schemeClr val="accent1"/>
-          </a:fillRef>
-          <a:effectRef idx="0">
-            <a:schemeClr val="accent1"/>
-          </a:effectRef>
-          <a:fontRef idx="minor">
-            <a:schemeClr val="lt1"/>
-          </a:fontRef>
-        </p:style>
-      </p:sp>
-      <p:sp useBgFill="1">
-        <p:nvSpPr>
-          <p:cNvPr id="14" name="Rectangle 13">
-            <a:extLst>
-              <a:ext uri="{FF2B5EF4-FFF2-40B4-BE49-F238E27FC236}">
-                <a16:creationId xmlns:a16="http://schemas.microsoft.com/office/drawing/2014/main" id="{EB8AA617-0537-4ED7-91B6-66511A647507}"/>
+                <a16:creationId xmlns:a16="http://schemas.microsoft.com/office/drawing/2014/main" id="{B5DC95B7-2A72-483B-BA19-2BE751205541}"/>
               </a:ext>
               <a:ext uri="{C183D7F6-B498-43B3-948B-1728B52AA6E4}">
                 <adec:decorative xmlns:adec="http://schemas.microsoft.com/office/drawing/2017/decorative" val="1"/>
@@ -16261,7 +15896,7 @@
         <p:spPr>
           <a:xfrm>
             <a:off x="0" y="0"/>
-            <a:ext cx="12191999" cy="6858000"/>
+            <a:ext cx="12192000" cy="6858000"/>
           </a:xfrm>
           <a:prstGeom prst="rect">
             <a:avLst/>
@@ -16297,10 +15932,10 @@
       </p:sp>
       <p:sp>
         <p:nvSpPr>
-          <p:cNvPr id="16" name="Rectangle 15">
+          <p:cNvPr id="30" name="Rectangle 24">
             <a:extLst>
               <a:ext uri="{FF2B5EF4-FFF2-40B4-BE49-F238E27FC236}">
-                <a16:creationId xmlns:a16="http://schemas.microsoft.com/office/drawing/2014/main" id="{C2E8BF1F-CE61-45C5-92AC-552D23176C03}"/>
+                <a16:creationId xmlns:a16="http://schemas.microsoft.com/office/drawing/2014/main" id="{1C822AFE-7E96-4A51-9E55-FCAEACD21357}"/>
               </a:ext>
               <a:ext uri="{C183D7F6-B498-43B3-948B-1728B52AA6E4}">
                 <adec:decorative xmlns:adec="http://schemas.microsoft.com/office/drawing/2017/decorative" val="1"/>
@@ -16320,8 +15955,8 @@
         </p:nvSpPr>
         <p:spPr>
           <a:xfrm>
-            <a:off x="0" y="4367639"/>
-            <a:ext cx="11707367" cy="1852186"/>
+            <a:off x="7850120" y="757325"/>
+            <a:ext cx="4341880" cy="5329325"/>
           </a:xfrm>
           <a:prstGeom prst="rect">
             <a:avLst/>
@@ -16349,6 +15984,14 @@
             <a:schemeClr val="lt1"/>
           </a:fontRef>
         </p:style>
+        <p:txBody>
+          <a:bodyPr rtlCol="0" anchor="ctr"/>
+          <a:lstStyle/>
+          <a:p>
+            <a:pPr algn="ctr"/>
+            <a:endParaRPr lang="en-US"/>
+          </a:p>
+        </p:txBody>
       </p:sp>
       <p:sp>
         <p:nvSpPr>
@@ -16368,48 +16011,104 @@
         </p:nvSpPr>
         <p:spPr>
           <a:xfrm>
-            <a:off x="1069848" y="4590661"/>
-            <a:ext cx="10210862" cy="1065690"/>
+            <a:off x="8161390" y="1079770"/>
+            <a:ext cx="3654857" cy="1527244"/>
           </a:xfrm>
         </p:spPr>
         <p:txBody>
-          <a:bodyPr vert="horz" lIns="91440" tIns="45720" rIns="91440" bIns="45720" rtlCol="0" anchor="b">
+          <a:bodyPr vert="horz" lIns="91440" tIns="45720" rIns="91440" bIns="45720" rtlCol="0">
             <a:normAutofit/>
           </a:bodyPr>
           <a:lstStyle/>
           <a:p>
             <a:r>
-              <a:rPr lang="en-US" sz="4100" spc="-100"/>
+              <a:rPr lang="en-US" sz="3200" spc="-100"/>
               <a:t>Who are the biggest publishers of those games?</a:t>
             </a:r>
           </a:p>
         </p:txBody>
       </p:sp>
+      <p:sp>
+        <p:nvSpPr>
+          <p:cNvPr id="31" name="Rectangle 26">
+            <a:extLst>
+              <a:ext uri="{FF2B5EF4-FFF2-40B4-BE49-F238E27FC236}">
+                <a16:creationId xmlns:a16="http://schemas.microsoft.com/office/drawing/2014/main" id="{9169EA61-C175-4B7E-807B-58199DEA7FB3}"/>
+              </a:ext>
+              <a:ext uri="{C183D7F6-B498-43B3-948B-1728B52AA6E4}">
+                <adec:decorative xmlns:adec="http://schemas.microsoft.com/office/drawing/2017/decorative" val="1"/>
+              </a:ext>
+            </a:extLst>
+          </p:cNvPr>
+          <p:cNvSpPr>
+            <a:spLocks noGrp="1" noRot="1" noChangeAspect="1" noMove="1" noResize="1" noEditPoints="1" noAdjustHandles="1" noChangeArrowheads="1" noChangeShapeType="1" noTextEdit="1"/>
+          </p:cNvSpPr>
+          <p:nvPr>
+            <p:extLst>
+              <p:ext uri="{386F3935-93C4-4BCD-93E2-E3B085C9AB24}">
+                <p16:designElem xmlns:p16="http://schemas.microsoft.com/office/powerpoint/2015/main" val="1"/>
+              </p:ext>
+            </p:extLst>
+          </p:nvPr>
+        </p:nvSpPr>
+        <p:spPr>
+          <a:xfrm>
+            <a:off x="0" y="758952"/>
+            <a:ext cx="384048" cy="5330952"/>
+          </a:xfrm>
+          <a:prstGeom prst="rect">
+            <a:avLst/>
+          </a:prstGeom>
+          <a:solidFill>
+            <a:srgbClr val="C8C8C8">
+              <a:alpha val="49804"/>
+            </a:srgbClr>
+          </a:solidFill>
+          <a:ln>
+            <a:noFill/>
+          </a:ln>
+        </p:spPr>
+        <p:style>
+          <a:lnRef idx="2">
+            <a:schemeClr val="accent1">
+              <a:shade val="50000"/>
+            </a:schemeClr>
+          </a:lnRef>
+          <a:fillRef idx="1">
+            <a:schemeClr val="accent1"/>
+          </a:fillRef>
+          <a:effectRef idx="0">
+            <a:schemeClr val="accent1"/>
+          </a:effectRef>
+          <a:fontRef idx="minor">
+            <a:schemeClr val="lt1"/>
+          </a:fontRef>
+        </p:style>
+      </p:sp>
       <p:pic>
         <p:nvPicPr>
-          <p:cNvPr id="5" name="Content Placeholder 4" descr="A screenshot of a cell phone&#10;&#10;Description automatically generated">
+          <p:cNvPr id="7" name="Content Placeholder 6" descr="A screenshot of a cell phone&#10;&#10;Description automatically generated">
             <a:extLst>
               <a:ext uri="{FF2B5EF4-FFF2-40B4-BE49-F238E27FC236}">
-                <a16:creationId xmlns:a16="http://schemas.microsoft.com/office/drawing/2014/main" id="{EDC059D4-105F-184B-9810-AE7B2A22D546}"/>
+                <a16:creationId xmlns:a16="http://schemas.microsoft.com/office/drawing/2014/main" id="{265ECC3A-78FB-1F4E-B76C-F4133131BEC1}"/>
               </a:ext>
             </a:extLst>
           </p:cNvPr>
           <p:cNvPicPr>
-            <a:picLocks noGrp="1" noChangeAspect="1"/>
+            <a:picLocks noChangeAspect="1"/>
           </p:cNvPicPr>
-          <p:nvPr>
-            <p:ph idx="1"/>
-          </p:nvPr>
+          <p:nvPr/>
         </p:nvPicPr>
-        <p:blipFill rotWithShape="1">
+        <p:blipFill>
           <a:blip r:embed="rId2"/>
-          <a:srcRect t="31144" r="1" b="14709"/>
-          <a:stretch/>
+          <a:stretch>
+            <a:fillRect/>
+          </a:stretch>
         </p:blipFill>
         <p:spPr>
           <a:xfrm>
-            <a:off x="1069847" y="462330"/>
-            <a:ext cx="10637520" cy="3556755"/>
+            <a:off x="864515" y="1414812"/>
+            <a:ext cx="6500974" cy="4014351"/>
           </a:xfrm>
           <a:prstGeom prst="rect">
             <a:avLst/>
@@ -16476,10 +16175,10 @@
       </p:sp>
       <p:pic>
         <p:nvPicPr>
-          <p:cNvPr id="5" name="Content Placeholder 4" descr="A picture containing drawing&#10;&#10;Description automatically generated">
+          <p:cNvPr id="7" name="Content Placeholder 6" descr="A screenshot of a cell phone&#10;&#10;Description automatically generated">
             <a:extLst>
               <a:ext uri="{FF2B5EF4-FFF2-40B4-BE49-F238E27FC236}">
-                <a16:creationId xmlns:a16="http://schemas.microsoft.com/office/drawing/2014/main" id="{004B98D5-BD37-F948-9449-FA7BC63D9E7E}"/>
+                <a16:creationId xmlns:a16="http://schemas.microsoft.com/office/drawing/2014/main" id="{4FCB1EDC-C118-F04C-A136-F7E614455E91}"/>
               </a:ext>
             </a:extLst>
           </p:cNvPr>
@@ -16519,6 +16218,14 @@
 <file path=ppt/slides/slide8.xml><?xml version="1.0" encoding="utf-8"?>
 <p:sld xmlns:a="http://schemas.openxmlformats.org/drawingml/2006/main" xmlns:r="http://schemas.openxmlformats.org/officeDocument/2006/relationships" xmlns:p="http://schemas.openxmlformats.org/presentationml/2006/main">
   <p:cSld>
+    <p:bg>
+      <p:bgPr>
+        <a:solidFill>
+          <a:schemeClr val="bg1"/>
+        </a:solidFill>
+        <a:effectLst/>
+      </p:bgPr>
+    </p:bg>
     <p:spTree>
       <p:nvGrpSpPr>
         <p:cNvPr id="1" name=""/>
@@ -16533,6 +16240,129 @@
           <a:chExt cx="0" cy="0"/>
         </a:xfrm>
       </p:grpSpPr>
+      <p:sp useBgFill="1">
+        <p:nvSpPr>
+          <p:cNvPr id="14" name="Rectangle 13">
+            <a:extLst>
+              <a:ext uri="{FF2B5EF4-FFF2-40B4-BE49-F238E27FC236}">
+                <a16:creationId xmlns:a16="http://schemas.microsoft.com/office/drawing/2014/main" id="{B5DC95B7-2A72-483B-BA19-2BE751205541}"/>
+              </a:ext>
+              <a:ext uri="{C183D7F6-B498-43B3-948B-1728B52AA6E4}">
+                <adec:decorative xmlns:adec="http://schemas.microsoft.com/office/drawing/2017/decorative" val="1"/>
+              </a:ext>
+            </a:extLst>
+          </p:cNvPr>
+          <p:cNvSpPr>
+            <a:spLocks noGrp="1" noRot="1" noChangeAspect="1" noMove="1" noResize="1" noEditPoints="1" noAdjustHandles="1" noChangeArrowheads="1" noChangeShapeType="1" noTextEdit="1"/>
+          </p:cNvSpPr>
+          <p:nvPr>
+            <p:extLst>
+              <p:ext uri="{386F3935-93C4-4BCD-93E2-E3B085C9AB24}">
+                <p16:designElem xmlns:p16="http://schemas.microsoft.com/office/powerpoint/2015/main" val="1"/>
+              </p:ext>
+            </p:extLst>
+          </p:nvPr>
+        </p:nvSpPr>
+        <p:spPr>
+          <a:xfrm>
+            <a:off x="0" y="0"/>
+            <a:ext cx="12192000" cy="6858000"/>
+          </a:xfrm>
+          <a:prstGeom prst="rect">
+            <a:avLst/>
+          </a:prstGeom>
+          <a:ln>
+            <a:noFill/>
+          </a:ln>
+        </p:spPr>
+        <p:style>
+          <a:lnRef idx="2">
+            <a:schemeClr val="accent1">
+              <a:shade val="50000"/>
+            </a:schemeClr>
+          </a:lnRef>
+          <a:fillRef idx="1">
+            <a:schemeClr val="accent1"/>
+          </a:fillRef>
+          <a:effectRef idx="0">
+            <a:schemeClr val="accent1"/>
+          </a:effectRef>
+          <a:fontRef idx="minor">
+            <a:schemeClr val="lt1"/>
+          </a:fontRef>
+        </p:style>
+        <p:txBody>
+          <a:bodyPr rtlCol="0" anchor="ctr"/>
+          <a:lstStyle/>
+          <a:p>
+            <a:pPr algn="ctr"/>
+            <a:endParaRPr lang="en-US"/>
+          </a:p>
+        </p:txBody>
+      </p:sp>
+      <p:sp>
+        <p:nvSpPr>
+          <p:cNvPr id="16" name="Rectangle 15">
+            <a:extLst>
+              <a:ext uri="{FF2B5EF4-FFF2-40B4-BE49-F238E27FC236}">
+                <a16:creationId xmlns:a16="http://schemas.microsoft.com/office/drawing/2014/main" id="{1C822AFE-7E96-4A51-9E55-FCAEACD21357}"/>
+              </a:ext>
+              <a:ext uri="{C183D7F6-B498-43B3-948B-1728B52AA6E4}">
+                <adec:decorative xmlns:adec="http://schemas.microsoft.com/office/drawing/2017/decorative" val="1"/>
+              </a:ext>
+            </a:extLst>
+          </p:cNvPr>
+          <p:cNvSpPr>
+            <a:spLocks noGrp="1" noRot="1" noChangeAspect="1" noMove="1" noResize="1" noEditPoints="1" noAdjustHandles="1" noChangeArrowheads="1" noChangeShapeType="1" noTextEdit="1"/>
+          </p:cNvSpPr>
+          <p:nvPr>
+            <p:extLst>
+              <p:ext uri="{386F3935-93C4-4BCD-93E2-E3B085C9AB24}">
+                <p16:designElem xmlns:p16="http://schemas.microsoft.com/office/powerpoint/2015/main" val="1"/>
+              </p:ext>
+            </p:extLst>
+          </p:nvPr>
+        </p:nvSpPr>
+        <p:spPr>
+          <a:xfrm>
+            <a:off x="7850120" y="757325"/>
+            <a:ext cx="4341880" cy="5329325"/>
+          </a:xfrm>
+          <a:prstGeom prst="rect">
+            <a:avLst/>
+          </a:prstGeom>
+          <a:solidFill>
+            <a:schemeClr val="accent1"/>
+          </a:solidFill>
+          <a:ln>
+            <a:noFill/>
+          </a:ln>
+        </p:spPr>
+        <p:style>
+          <a:lnRef idx="2">
+            <a:schemeClr val="accent1">
+              <a:shade val="50000"/>
+            </a:schemeClr>
+          </a:lnRef>
+          <a:fillRef idx="1">
+            <a:schemeClr val="accent1"/>
+          </a:fillRef>
+          <a:effectRef idx="0">
+            <a:schemeClr val="accent1"/>
+          </a:effectRef>
+          <a:fontRef idx="minor">
+            <a:schemeClr val="lt1"/>
+          </a:fontRef>
+        </p:style>
+        <p:txBody>
+          <a:bodyPr rtlCol="0" anchor="ctr"/>
+          <a:lstStyle/>
+          <a:p>
+            <a:pPr algn="ctr"/>
+            <a:endParaRPr lang="en-US"/>
+          </a:p>
+        </p:txBody>
+      </p:sp>
       <p:sp>
         <p:nvSpPr>
           <p:cNvPr id="2" name="Title 1">
@@ -16549,33 +16379,95 @@
             <p:ph type="title"/>
           </p:nvPr>
         </p:nvSpPr>
-        <p:spPr/>
+        <p:spPr>
+          <a:xfrm>
+            <a:off x="8161390" y="1079770"/>
+            <a:ext cx="3654857" cy="1527244"/>
+          </a:xfrm>
+        </p:spPr>
         <p:txBody>
-          <a:bodyPr/>
+          <a:bodyPr>
+            <a:normAutofit/>
+          </a:bodyPr>
           <a:lstStyle/>
           <a:p>
             <a:r>
-              <a:rPr lang="en-US" dirty="0"/>
+              <a:rPr lang="en-US" sz="3200"/>
               <a:t>Is there a relationship between global sales and critic scores?</a:t>
             </a:r>
           </a:p>
         </p:txBody>
       </p:sp>
+      <p:sp>
+        <p:nvSpPr>
+          <p:cNvPr id="18" name="Rectangle 17">
+            <a:extLst>
+              <a:ext uri="{FF2B5EF4-FFF2-40B4-BE49-F238E27FC236}">
+                <a16:creationId xmlns:a16="http://schemas.microsoft.com/office/drawing/2014/main" id="{9169EA61-C175-4B7E-807B-58199DEA7FB3}"/>
+              </a:ext>
+              <a:ext uri="{C183D7F6-B498-43B3-948B-1728B52AA6E4}">
+                <adec:decorative xmlns:adec="http://schemas.microsoft.com/office/drawing/2017/decorative" val="1"/>
+              </a:ext>
+            </a:extLst>
+          </p:cNvPr>
+          <p:cNvSpPr>
+            <a:spLocks noGrp="1" noRot="1" noChangeAspect="1" noMove="1" noResize="1" noEditPoints="1" noAdjustHandles="1" noChangeArrowheads="1" noChangeShapeType="1" noTextEdit="1"/>
+          </p:cNvSpPr>
+          <p:nvPr>
+            <p:extLst>
+              <p:ext uri="{386F3935-93C4-4BCD-93E2-E3B085C9AB24}">
+                <p16:designElem xmlns:p16="http://schemas.microsoft.com/office/powerpoint/2015/main" val="1"/>
+              </p:ext>
+            </p:extLst>
+          </p:nvPr>
+        </p:nvSpPr>
+        <p:spPr>
+          <a:xfrm>
+            <a:off x="0" y="758952"/>
+            <a:ext cx="384048" cy="5330952"/>
+          </a:xfrm>
+          <a:prstGeom prst="rect">
+            <a:avLst/>
+          </a:prstGeom>
+          <a:solidFill>
+            <a:srgbClr val="C8C8C8">
+              <a:alpha val="49804"/>
+            </a:srgbClr>
+          </a:solidFill>
+          <a:ln>
+            <a:noFill/>
+          </a:ln>
+        </p:spPr>
+        <p:style>
+          <a:lnRef idx="2">
+            <a:schemeClr val="accent1">
+              <a:shade val="50000"/>
+            </a:schemeClr>
+          </a:lnRef>
+          <a:fillRef idx="1">
+            <a:schemeClr val="accent1"/>
+          </a:fillRef>
+          <a:effectRef idx="0">
+            <a:schemeClr val="accent1"/>
+          </a:effectRef>
+          <a:fontRef idx="minor">
+            <a:schemeClr val="lt1"/>
+          </a:fontRef>
+        </p:style>
+      </p:sp>
       <p:pic>
         <p:nvPicPr>
-          <p:cNvPr id="5" name="Content Placeholder 4" descr="A picture containing white, photo, water, group&#10;&#10;Description automatically generated">
+          <p:cNvPr id="7" name="Content Placeholder 6" descr="A picture containing photo, white, water, group&#10;&#10;Description automatically generated">
             <a:extLst>
               <a:ext uri="{FF2B5EF4-FFF2-40B4-BE49-F238E27FC236}">
-                <a16:creationId xmlns:a16="http://schemas.microsoft.com/office/drawing/2014/main" id="{AFA632B0-89AC-7E4F-BEDF-7CA9264090CA}"/>
+                <a16:creationId xmlns:a16="http://schemas.microsoft.com/office/drawing/2014/main" id="{3213EBB8-537D-A840-8335-3B1522261468}"/>
               </a:ext>
             </a:extLst>
           </p:cNvPr>
           <p:cNvPicPr>
-            <a:picLocks noGrp="1" noChangeAspect="1"/>
+            <a:picLocks noChangeAspect="1"/>
           </p:cNvPicPr>
-          <p:nvPr>
-            <p:ph idx="1"/>
-          </p:nvPr>
+          <p:nvPr/>
         </p:nvPicPr>
         <p:blipFill>
           <a:blip r:embed="rId2"/>
@@ -16585,9 +16477,12 @@
         </p:blipFill>
         <p:spPr>
           <a:xfrm>
-            <a:off x="3868738" y="1165427"/>
-            <a:ext cx="7315200" cy="4517621"/>
+            <a:off x="864515" y="1414812"/>
+            <a:ext cx="6500974" cy="4014351"/>
           </a:xfrm>
+          <a:prstGeom prst="rect">
+            <a:avLst/>
+          </a:prstGeom>
         </p:spPr>
       </p:pic>
     </p:spTree>
@@ -16650,10 +16545,10 @@
       </p:sp>
       <p:pic>
         <p:nvPicPr>
-          <p:cNvPr id="5" name="Content Placeholder 4" descr="A picture containing indoor, sitting, white&#10;&#10;Description automatically generated">
+          <p:cNvPr id="7" name="Content Placeholder 6" descr="A screenshot of a cell phone&#10;&#10;Description automatically generated">
             <a:extLst>
               <a:ext uri="{FF2B5EF4-FFF2-40B4-BE49-F238E27FC236}">
-                <a16:creationId xmlns:a16="http://schemas.microsoft.com/office/drawing/2014/main" id="{21A99931-C44C-144F-90D2-571968355CD8}"/>
+                <a16:creationId xmlns:a16="http://schemas.microsoft.com/office/drawing/2014/main" id="{FC53FD34-FF99-E94E-944C-A270B56CBB61}"/>
               </a:ext>
             </a:extLst>
           </p:cNvPr>

</xml_diff>